<commit_message>
Update Storage component of DG
</commit_message>
<xml_diff>
--- a/docs/diagrams/StorageComponentClassDiagram.pptx
+++ b/docs/diagrams/StorageComponentClassDiagram.pptx
@@ -107,6 +107,22 @@
       </a:defRPr>
     </a:lvl9pPr>
   </p:defaultTextStyle>
+  <p:extLst>
+    <p:ext uri="{EFAFB233-063F-42B5-8137-9DF3F51BA10A}">
+      <p15:sldGuideLst xmlns:p15="http://schemas.microsoft.com/office/powerpoint/2012/main">
+        <p15:guide id="1" orient="horz" pos="1488">
+          <p15:clr>
+            <a:srgbClr val="A4A3A4"/>
+          </p15:clr>
+        </p15:guide>
+        <p15:guide id="2" pos="2880">
+          <p15:clr>
+            <a:srgbClr val="A4A3A4"/>
+          </p15:clr>
+        </p15:guide>
+      </p15:sldGuideLst>
+    </p:ext>
+  </p:extLst>
 </p:presentation>
 </file>
 
@@ -192,7 +208,7 @@
           <a:p>
             <a:fld id="{F5CC4B3F-88C1-4FFA-B1B6-F41C21DC6924}" type="datetimeFigureOut">
               <a:rPr lang="en-US" smtClean="0"/>
-              <a:t>10/16/2016</a:t>
+              <a:t>11/11/2018</a:t>
             </a:fld>
             <a:endParaRPr lang="en-US"/>
           </a:p>
@@ -256,38 +272,37 @@
           <a:p>
             <a:pPr lvl="0"/>
             <a:r>
-              <a:rPr lang="en-US" smtClean="0"/>
+              <a:rPr lang="en-US"/>
               <a:t>Click to edit Master text styles</a:t>
             </a:r>
           </a:p>
           <a:p>
             <a:pPr lvl="1"/>
             <a:r>
-              <a:rPr lang="en-US" smtClean="0"/>
+              <a:rPr lang="en-US"/>
               <a:t>Second level</a:t>
             </a:r>
           </a:p>
           <a:p>
             <a:pPr lvl="2"/>
             <a:r>
-              <a:rPr lang="en-US" smtClean="0"/>
+              <a:rPr lang="en-US"/>
               <a:t>Third level</a:t>
             </a:r>
           </a:p>
           <a:p>
             <a:pPr lvl="3"/>
             <a:r>
-              <a:rPr lang="en-US" smtClean="0"/>
+              <a:rPr lang="en-US"/>
               <a:t>Fourth level</a:t>
             </a:r>
           </a:p>
           <a:p>
             <a:pPr lvl="4"/>
             <a:r>
-              <a:rPr lang="en-US" smtClean="0"/>
+              <a:rPr lang="en-US"/>
               <a:t>Fifth level</a:t>
             </a:r>
-            <a:endParaRPr lang="en-US"/>
           </a:p>
         </p:txBody>
       </p:sp>
@@ -460,6 +475,90 @@
 </p:notesMaster>
 </file>
 
+<file path=ppt/notesSlides/notesSlide1.xml><?xml version="1.0" encoding="utf-8"?>
+<p:notes xmlns:a="http://schemas.openxmlformats.org/drawingml/2006/main" xmlns:r="http://schemas.openxmlformats.org/officeDocument/2006/relationships" xmlns:p="http://schemas.openxmlformats.org/presentationml/2006/main">
+  <p:cSld>
+    <p:spTree>
+      <p:nvGrpSpPr>
+        <p:cNvPr id="1" name=""/>
+        <p:cNvGrpSpPr/>
+        <p:nvPr/>
+      </p:nvGrpSpPr>
+      <p:grpSpPr>
+        <a:xfrm>
+          <a:off x="0" y="0"/>
+          <a:ext cx="0" cy="0"/>
+          <a:chOff x="0" y="0"/>
+          <a:chExt cx="0" cy="0"/>
+        </a:xfrm>
+      </p:grpSpPr>
+      <p:sp>
+        <p:nvSpPr>
+          <p:cNvPr id="2" name="Slide Image Placeholder 1"/>
+          <p:cNvSpPr>
+            <a:spLocks noGrp="1" noRot="1" noChangeAspect="1"/>
+          </p:cNvSpPr>
+          <p:nvPr>
+            <p:ph type="sldImg"/>
+          </p:nvPr>
+        </p:nvSpPr>
+        <p:spPr/>
+      </p:sp>
+      <p:sp>
+        <p:nvSpPr>
+          <p:cNvPr id="3" name="Notes Placeholder 2"/>
+          <p:cNvSpPr>
+            <a:spLocks noGrp="1"/>
+          </p:cNvSpPr>
+          <p:nvPr>
+            <p:ph type="body" idx="1"/>
+          </p:nvPr>
+        </p:nvSpPr>
+        <p:spPr/>
+        <p:txBody>
+          <a:bodyPr/>
+          <a:lstStyle/>
+          <a:p>
+            <a:endParaRPr lang="en-SG" dirty="0"/>
+          </a:p>
+        </p:txBody>
+      </p:sp>
+      <p:sp>
+        <p:nvSpPr>
+          <p:cNvPr id="4" name="Slide Number Placeholder 3"/>
+          <p:cNvSpPr>
+            <a:spLocks noGrp="1"/>
+          </p:cNvSpPr>
+          <p:nvPr>
+            <p:ph type="sldNum" sz="quarter" idx="5"/>
+          </p:nvPr>
+        </p:nvSpPr>
+        <p:spPr/>
+        <p:txBody>
+          <a:bodyPr/>
+          <a:lstStyle/>
+          <a:p>
+            <a:fld id="{5A7AB025-77E3-4BD1-A2FD-B3183DBA47A3}" type="slidenum">
+              <a:rPr lang="en-US" smtClean="0"/>
+              <a:t>1</a:t>
+            </a:fld>
+            <a:endParaRPr lang="en-US"/>
+          </a:p>
+        </p:txBody>
+      </p:sp>
+    </p:spTree>
+    <p:extLst>
+      <p:ext uri="{BB962C8B-B14F-4D97-AF65-F5344CB8AC3E}">
+        <p14:creationId xmlns:p14="http://schemas.microsoft.com/office/powerpoint/2010/main" val="2825902672"/>
+      </p:ext>
+    </p:extLst>
+  </p:cSld>
+  <p:clrMapOvr>
+    <a:masterClrMapping/>
+  </p:clrMapOvr>
+</p:notes>
+</file>
+
 <file path=ppt/slideLayouts/slideLayout1.xml><?xml version="1.0" encoding="utf-8"?>
 <p:sldLayout xmlns:a="http://schemas.openxmlformats.org/drawingml/2006/main" xmlns:r="http://schemas.openxmlformats.org/officeDocument/2006/relationships" xmlns:p="http://schemas.openxmlformats.org/presentationml/2006/main" type="title" preserve="1">
   <p:cSld name="Title Slide">
@@ -498,10 +597,9 @@
           <a:lstStyle/>
           <a:p>
             <a:r>
-              <a:rPr lang="en-US" smtClean="0"/>
+              <a:rPr lang="en-US"/>
               <a:t>Click to edit Master title style</a:t>
             </a:r>
-            <a:endParaRPr lang="en-US"/>
           </a:p>
         </p:txBody>
       </p:sp>
@@ -617,10 +715,9 @@
           </a:lstStyle>
           <a:p>
             <a:r>
-              <a:rPr lang="en-US" smtClean="0"/>
+              <a:rPr lang="en-US"/>
               <a:t>Click to edit Master subtitle style</a:t>
             </a:r>
-            <a:endParaRPr lang="en-US"/>
           </a:p>
         </p:txBody>
       </p:sp>
@@ -641,7 +738,7 @@
           <a:p>
             <a:fld id="{78C97017-6FC3-485B-9764-EAC9E56C1D49}" type="datetimeFigureOut">
               <a:rPr lang="en-US" smtClean="0"/>
-              <a:t>10/16/2016</a:t>
+              <a:t>11/11/2018</a:t>
             </a:fld>
             <a:endParaRPr lang="en-US"/>
           </a:p>
@@ -735,10 +832,9 @@
           <a:lstStyle/>
           <a:p>
             <a:r>
-              <a:rPr lang="en-US" smtClean="0"/>
+              <a:rPr lang="en-US"/>
               <a:t>Click to edit Master title style</a:t>
             </a:r>
-            <a:endParaRPr lang="en-US"/>
           </a:p>
         </p:txBody>
       </p:sp>
@@ -759,38 +855,37 @@
           <a:p>
             <a:pPr lvl="0"/>
             <a:r>
-              <a:rPr lang="en-US" smtClean="0"/>
+              <a:rPr lang="en-US"/>
               <a:t>Click to edit Master text styles</a:t>
             </a:r>
           </a:p>
           <a:p>
             <a:pPr lvl="1"/>
             <a:r>
-              <a:rPr lang="en-US" smtClean="0"/>
+              <a:rPr lang="en-US"/>
               <a:t>Second level</a:t>
             </a:r>
           </a:p>
           <a:p>
             <a:pPr lvl="2"/>
             <a:r>
-              <a:rPr lang="en-US" smtClean="0"/>
+              <a:rPr lang="en-US"/>
               <a:t>Third level</a:t>
             </a:r>
           </a:p>
           <a:p>
             <a:pPr lvl="3"/>
             <a:r>
-              <a:rPr lang="en-US" smtClean="0"/>
+              <a:rPr lang="en-US"/>
               <a:t>Fourth level</a:t>
             </a:r>
           </a:p>
           <a:p>
             <a:pPr lvl="4"/>
             <a:r>
-              <a:rPr lang="en-US" smtClean="0"/>
+              <a:rPr lang="en-US"/>
               <a:t>Fifth level</a:t>
             </a:r>
-            <a:endParaRPr lang="en-US"/>
           </a:p>
         </p:txBody>
       </p:sp>
@@ -811,7 +906,7 @@
           <a:p>
             <a:fld id="{78C97017-6FC3-485B-9764-EAC9E56C1D49}" type="datetimeFigureOut">
               <a:rPr lang="en-US" smtClean="0"/>
-              <a:t>10/16/2016</a:t>
+              <a:t>11/11/2018</a:t>
             </a:fld>
             <a:endParaRPr lang="en-US"/>
           </a:p>
@@ -910,10 +1005,9 @@
           <a:lstStyle/>
           <a:p>
             <a:r>
-              <a:rPr lang="en-US" smtClean="0"/>
+              <a:rPr lang="en-US"/>
               <a:t>Click to edit Master title style</a:t>
             </a:r>
-            <a:endParaRPr lang="en-US"/>
           </a:p>
         </p:txBody>
       </p:sp>
@@ -939,38 +1033,37 @@
           <a:p>
             <a:pPr lvl="0"/>
             <a:r>
-              <a:rPr lang="en-US" smtClean="0"/>
+              <a:rPr lang="en-US"/>
               <a:t>Click to edit Master text styles</a:t>
             </a:r>
           </a:p>
           <a:p>
             <a:pPr lvl="1"/>
             <a:r>
-              <a:rPr lang="en-US" smtClean="0"/>
+              <a:rPr lang="en-US"/>
               <a:t>Second level</a:t>
             </a:r>
           </a:p>
           <a:p>
             <a:pPr lvl="2"/>
             <a:r>
-              <a:rPr lang="en-US" smtClean="0"/>
+              <a:rPr lang="en-US"/>
               <a:t>Third level</a:t>
             </a:r>
           </a:p>
           <a:p>
             <a:pPr lvl="3"/>
             <a:r>
-              <a:rPr lang="en-US" smtClean="0"/>
+              <a:rPr lang="en-US"/>
               <a:t>Fourth level</a:t>
             </a:r>
           </a:p>
           <a:p>
             <a:pPr lvl="4"/>
             <a:r>
-              <a:rPr lang="en-US" smtClean="0"/>
+              <a:rPr lang="en-US"/>
               <a:t>Fifth level</a:t>
             </a:r>
-            <a:endParaRPr lang="en-US"/>
           </a:p>
         </p:txBody>
       </p:sp>
@@ -991,7 +1084,7 @@
           <a:p>
             <a:fld id="{78C97017-6FC3-485B-9764-EAC9E56C1D49}" type="datetimeFigureOut">
               <a:rPr lang="en-US" smtClean="0"/>
-              <a:t>10/16/2016</a:t>
+              <a:t>11/11/2018</a:t>
             </a:fld>
             <a:endParaRPr lang="en-US"/>
           </a:p>
@@ -1085,10 +1178,9 @@
           <a:lstStyle/>
           <a:p>
             <a:r>
-              <a:rPr lang="en-US" smtClean="0"/>
+              <a:rPr lang="en-US"/>
               <a:t>Click to edit Master title style</a:t>
             </a:r>
-            <a:endParaRPr lang="en-US"/>
           </a:p>
         </p:txBody>
       </p:sp>
@@ -1109,38 +1201,37 @@
           <a:p>
             <a:pPr lvl="0"/>
             <a:r>
-              <a:rPr lang="en-US" smtClean="0"/>
+              <a:rPr lang="en-US"/>
               <a:t>Click to edit Master text styles</a:t>
             </a:r>
           </a:p>
           <a:p>
             <a:pPr lvl="1"/>
             <a:r>
-              <a:rPr lang="en-US" smtClean="0"/>
+              <a:rPr lang="en-US"/>
               <a:t>Second level</a:t>
             </a:r>
           </a:p>
           <a:p>
             <a:pPr lvl="2"/>
             <a:r>
-              <a:rPr lang="en-US" smtClean="0"/>
+              <a:rPr lang="en-US"/>
               <a:t>Third level</a:t>
             </a:r>
           </a:p>
           <a:p>
             <a:pPr lvl="3"/>
             <a:r>
-              <a:rPr lang="en-US" smtClean="0"/>
+              <a:rPr lang="en-US"/>
               <a:t>Fourth level</a:t>
             </a:r>
           </a:p>
           <a:p>
             <a:pPr lvl="4"/>
             <a:r>
-              <a:rPr lang="en-US" smtClean="0"/>
+              <a:rPr lang="en-US"/>
               <a:t>Fifth level</a:t>
             </a:r>
-            <a:endParaRPr lang="en-US"/>
           </a:p>
         </p:txBody>
       </p:sp>
@@ -1161,7 +1252,7 @@
           <a:p>
             <a:fld id="{78C97017-6FC3-485B-9764-EAC9E56C1D49}" type="datetimeFigureOut">
               <a:rPr lang="en-US" smtClean="0"/>
-              <a:t>10/16/2016</a:t>
+              <a:t>11/11/2018</a:t>
             </a:fld>
             <a:endParaRPr lang="en-US"/>
           </a:p>
@@ -1264,10 +1355,9 @@
           </a:lstStyle>
           <a:p>
             <a:r>
-              <a:rPr lang="en-US" smtClean="0"/>
+              <a:rPr lang="en-US"/>
               <a:t>Click to edit Master title style</a:t>
             </a:r>
-            <a:endParaRPr lang="en-US"/>
           </a:p>
         </p:txBody>
       </p:sp>
@@ -1384,7 +1474,7 @@
           <a:p>
             <a:pPr lvl="0"/>
             <a:r>
-              <a:rPr lang="en-US" smtClean="0"/>
+              <a:rPr lang="en-US"/>
               <a:t>Click to edit Master text styles</a:t>
             </a:r>
           </a:p>
@@ -1407,7 +1497,7 @@
           <a:p>
             <a:fld id="{78C97017-6FC3-485B-9764-EAC9E56C1D49}" type="datetimeFigureOut">
               <a:rPr lang="en-US" smtClean="0"/>
-              <a:t>10/16/2016</a:t>
+              <a:t>11/11/2018</a:t>
             </a:fld>
             <a:endParaRPr lang="en-US"/>
           </a:p>
@@ -1501,10 +1591,9 @@
           <a:lstStyle/>
           <a:p>
             <a:r>
-              <a:rPr lang="en-US" smtClean="0"/>
+              <a:rPr lang="en-US"/>
               <a:t>Click to edit Master title style</a:t>
             </a:r>
-            <a:endParaRPr lang="en-US"/>
           </a:p>
         </p:txBody>
       </p:sp>
@@ -1558,38 +1647,37 @@
           <a:p>
             <a:pPr lvl="0"/>
             <a:r>
-              <a:rPr lang="en-US" smtClean="0"/>
+              <a:rPr lang="en-US"/>
               <a:t>Click to edit Master text styles</a:t>
             </a:r>
           </a:p>
           <a:p>
             <a:pPr lvl="1"/>
             <a:r>
-              <a:rPr lang="en-US" smtClean="0"/>
+              <a:rPr lang="en-US"/>
               <a:t>Second level</a:t>
             </a:r>
           </a:p>
           <a:p>
             <a:pPr lvl="2"/>
             <a:r>
-              <a:rPr lang="en-US" smtClean="0"/>
+              <a:rPr lang="en-US"/>
               <a:t>Third level</a:t>
             </a:r>
           </a:p>
           <a:p>
             <a:pPr lvl="3"/>
             <a:r>
-              <a:rPr lang="en-US" smtClean="0"/>
+              <a:rPr lang="en-US"/>
               <a:t>Fourth level</a:t>
             </a:r>
           </a:p>
           <a:p>
             <a:pPr lvl="4"/>
             <a:r>
-              <a:rPr lang="en-US" smtClean="0"/>
+              <a:rPr lang="en-US"/>
               <a:t>Fifth level</a:t>
             </a:r>
-            <a:endParaRPr lang="en-US"/>
           </a:p>
         </p:txBody>
       </p:sp>
@@ -1643,38 +1731,37 @@
           <a:p>
             <a:pPr lvl="0"/>
             <a:r>
-              <a:rPr lang="en-US" smtClean="0"/>
+              <a:rPr lang="en-US"/>
               <a:t>Click to edit Master text styles</a:t>
             </a:r>
           </a:p>
           <a:p>
             <a:pPr lvl="1"/>
             <a:r>
-              <a:rPr lang="en-US" smtClean="0"/>
+              <a:rPr lang="en-US"/>
               <a:t>Second level</a:t>
             </a:r>
           </a:p>
           <a:p>
             <a:pPr lvl="2"/>
             <a:r>
-              <a:rPr lang="en-US" smtClean="0"/>
+              <a:rPr lang="en-US"/>
               <a:t>Third level</a:t>
             </a:r>
           </a:p>
           <a:p>
             <a:pPr lvl="3"/>
             <a:r>
-              <a:rPr lang="en-US" smtClean="0"/>
+              <a:rPr lang="en-US"/>
               <a:t>Fourth level</a:t>
             </a:r>
           </a:p>
           <a:p>
             <a:pPr lvl="4"/>
             <a:r>
-              <a:rPr lang="en-US" smtClean="0"/>
+              <a:rPr lang="en-US"/>
               <a:t>Fifth level</a:t>
             </a:r>
-            <a:endParaRPr lang="en-US"/>
           </a:p>
         </p:txBody>
       </p:sp>
@@ -1695,7 +1782,7 @@
           <a:p>
             <a:fld id="{78C97017-6FC3-485B-9764-EAC9E56C1D49}" type="datetimeFigureOut">
               <a:rPr lang="en-US" smtClean="0"/>
-              <a:t>10/16/2016</a:t>
+              <a:t>11/11/2018</a:t>
             </a:fld>
             <a:endParaRPr lang="en-US"/>
           </a:p>
@@ -1793,10 +1880,9 @@
           </a:lstStyle>
           <a:p>
             <a:r>
-              <a:rPr lang="en-US" smtClean="0"/>
+              <a:rPr lang="en-US"/>
               <a:t>Click to edit Master title style</a:t>
             </a:r>
-            <a:endParaRPr lang="en-US"/>
           </a:p>
         </p:txBody>
       </p:sp>
@@ -1859,7 +1945,7 @@
           <a:p>
             <a:pPr lvl="0"/>
             <a:r>
-              <a:rPr lang="en-US" smtClean="0"/>
+              <a:rPr lang="en-US"/>
               <a:t>Click to edit Master text styles</a:t>
             </a:r>
           </a:p>
@@ -1915,38 +2001,37 @@
           <a:p>
             <a:pPr lvl="0"/>
             <a:r>
-              <a:rPr lang="en-US" smtClean="0"/>
+              <a:rPr lang="en-US"/>
               <a:t>Click to edit Master text styles</a:t>
             </a:r>
           </a:p>
           <a:p>
             <a:pPr lvl="1"/>
             <a:r>
-              <a:rPr lang="en-US" smtClean="0"/>
+              <a:rPr lang="en-US"/>
               <a:t>Second level</a:t>
             </a:r>
           </a:p>
           <a:p>
             <a:pPr lvl="2"/>
             <a:r>
-              <a:rPr lang="en-US" smtClean="0"/>
+              <a:rPr lang="en-US"/>
               <a:t>Third level</a:t>
             </a:r>
           </a:p>
           <a:p>
             <a:pPr lvl="3"/>
             <a:r>
-              <a:rPr lang="en-US" smtClean="0"/>
+              <a:rPr lang="en-US"/>
               <a:t>Fourth level</a:t>
             </a:r>
           </a:p>
           <a:p>
             <a:pPr lvl="4"/>
             <a:r>
-              <a:rPr lang="en-US" smtClean="0"/>
+              <a:rPr lang="en-US"/>
               <a:t>Fifth level</a:t>
             </a:r>
-            <a:endParaRPr lang="en-US"/>
           </a:p>
         </p:txBody>
       </p:sp>
@@ -2009,7 +2094,7 @@
           <a:p>
             <a:pPr lvl="0"/>
             <a:r>
-              <a:rPr lang="en-US" smtClean="0"/>
+              <a:rPr lang="en-US"/>
               <a:t>Click to edit Master text styles</a:t>
             </a:r>
           </a:p>
@@ -2065,38 +2150,37 @@
           <a:p>
             <a:pPr lvl="0"/>
             <a:r>
-              <a:rPr lang="en-US" smtClean="0"/>
+              <a:rPr lang="en-US"/>
               <a:t>Click to edit Master text styles</a:t>
             </a:r>
           </a:p>
           <a:p>
             <a:pPr lvl="1"/>
             <a:r>
-              <a:rPr lang="en-US" smtClean="0"/>
+              <a:rPr lang="en-US"/>
               <a:t>Second level</a:t>
             </a:r>
           </a:p>
           <a:p>
             <a:pPr lvl="2"/>
             <a:r>
-              <a:rPr lang="en-US" smtClean="0"/>
+              <a:rPr lang="en-US"/>
               <a:t>Third level</a:t>
             </a:r>
           </a:p>
           <a:p>
             <a:pPr lvl="3"/>
             <a:r>
-              <a:rPr lang="en-US" smtClean="0"/>
+              <a:rPr lang="en-US"/>
               <a:t>Fourth level</a:t>
             </a:r>
           </a:p>
           <a:p>
             <a:pPr lvl="4"/>
             <a:r>
-              <a:rPr lang="en-US" smtClean="0"/>
+              <a:rPr lang="en-US"/>
               <a:t>Fifth level</a:t>
             </a:r>
-            <a:endParaRPr lang="en-US"/>
           </a:p>
         </p:txBody>
       </p:sp>
@@ -2117,7 +2201,7 @@
           <a:p>
             <a:fld id="{78C97017-6FC3-485B-9764-EAC9E56C1D49}" type="datetimeFigureOut">
               <a:rPr lang="en-US" smtClean="0"/>
-              <a:t>10/16/2016</a:t>
+              <a:t>11/11/2018</a:t>
             </a:fld>
             <a:endParaRPr lang="en-US"/>
           </a:p>
@@ -2211,10 +2295,9 @@
           <a:lstStyle/>
           <a:p>
             <a:r>
-              <a:rPr lang="en-US" smtClean="0"/>
+              <a:rPr lang="en-US"/>
               <a:t>Click to edit Master title style</a:t>
             </a:r>
-            <a:endParaRPr lang="en-US"/>
           </a:p>
         </p:txBody>
       </p:sp>
@@ -2235,7 +2318,7 @@
           <a:p>
             <a:fld id="{78C97017-6FC3-485B-9764-EAC9E56C1D49}" type="datetimeFigureOut">
               <a:rPr lang="en-US" smtClean="0"/>
-              <a:t>10/16/2016</a:t>
+              <a:t>11/11/2018</a:t>
             </a:fld>
             <a:endParaRPr lang="en-US"/>
           </a:p>
@@ -2330,7 +2413,7 @@
           <a:p>
             <a:fld id="{78C97017-6FC3-485B-9764-EAC9E56C1D49}" type="datetimeFigureOut">
               <a:rPr lang="en-US" smtClean="0"/>
-              <a:t>10/16/2016</a:t>
+              <a:t>11/11/2018</a:t>
             </a:fld>
             <a:endParaRPr lang="en-US"/>
           </a:p>
@@ -2433,10 +2516,9 @@
           </a:lstStyle>
           <a:p>
             <a:r>
-              <a:rPr lang="en-US" smtClean="0"/>
+              <a:rPr lang="en-US"/>
               <a:t>Click to edit Master title style</a:t>
             </a:r>
-            <a:endParaRPr lang="en-US"/>
           </a:p>
         </p:txBody>
       </p:sp>
@@ -2490,38 +2572,37 @@
           <a:p>
             <a:pPr lvl="0"/>
             <a:r>
-              <a:rPr lang="en-US" smtClean="0"/>
+              <a:rPr lang="en-US"/>
               <a:t>Click to edit Master text styles</a:t>
             </a:r>
           </a:p>
           <a:p>
             <a:pPr lvl="1"/>
             <a:r>
-              <a:rPr lang="en-US" smtClean="0"/>
+              <a:rPr lang="en-US"/>
               <a:t>Second level</a:t>
             </a:r>
           </a:p>
           <a:p>
             <a:pPr lvl="2"/>
             <a:r>
-              <a:rPr lang="en-US" smtClean="0"/>
+              <a:rPr lang="en-US"/>
               <a:t>Third level</a:t>
             </a:r>
           </a:p>
           <a:p>
             <a:pPr lvl="3"/>
             <a:r>
-              <a:rPr lang="en-US" smtClean="0"/>
+              <a:rPr lang="en-US"/>
               <a:t>Fourth level</a:t>
             </a:r>
           </a:p>
           <a:p>
             <a:pPr lvl="4"/>
             <a:r>
-              <a:rPr lang="en-US" smtClean="0"/>
+              <a:rPr lang="en-US"/>
               <a:t>Fifth level</a:t>
             </a:r>
-            <a:endParaRPr lang="en-US"/>
           </a:p>
         </p:txBody>
       </p:sp>
@@ -2584,7 +2665,7 @@
           <a:p>
             <a:pPr lvl="0"/>
             <a:r>
-              <a:rPr lang="en-US" smtClean="0"/>
+              <a:rPr lang="en-US"/>
               <a:t>Click to edit Master text styles</a:t>
             </a:r>
           </a:p>
@@ -2607,7 +2688,7 @@
           <a:p>
             <a:fld id="{78C97017-6FC3-485B-9764-EAC9E56C1D49}" type="datetimeFigureOut">
               <a:rPr lang="en-US" smtClean="0"/>
-              <a:t>10/16/2016</a:t>
+              <a:t>11/11/2018</a:t>
             </a:fld>
             <a:endParaRPr lang="en-US"/>
           </a:p>
@@ -2710,10 +2791,9 @@
           </a:lstStyle>
           <a:p>
             <a:r>
-              <a:rPr lang="en-US" smtClean="0"/>
+              <a:rPr lang="en-US"/>
               <a:t>Click to edit Master title style</a:t>
             </a:r>
-            <a:endParaRPr lang="en-US"/>
           </a:p>
         </p:txBody>
       </p:sp>
@@ -2837,7 +2917,7 @@
           <a:p>
             <a:pPr lvl="0"/>
             <a:r>
-              <a:rPr lang="en-US" smtClean="0"/>
+              <a:rPr lang="en-US"/>
               <a:t>Click to edit Master text styles</a:t>
             </a:r>
           </a:p>
@@ -2860,7 +2940,7 @@
           <a:p>
             <a:fld id="{78C97017-6FC3-485B-9764-EAC9E56C1D49}" type="datetimeFigureOut">
               <a:rPr lang="en-US" smtClean="0"/>
-              <a:t>10/16/2016</a:t>
+              <a:t>11/11/2018</a:t>
             </a:fld>
             <a:endParaRPr lang="en-US"/>
           </a:p>
@@ -2969,10 +3049,9 @@
           <a:lstStyle/>
           <a:p>
             <a:r>
-              <a:rPr lang="en-US" smtClean="0"/>
+              <a:rPr lang="en-US"/>
               <a:t>Click to edit Master title style</a:t>
             </a:r>
-            <a:endParaRPr lang="en-US"/>
           </a:p>
         </p:txBody>
       </p:sp>
@@ -3003,38 +3082,37 @@
           <a:p>
             <a:pPr lvl="0"/>
             <a:r>
-              <a:rPr lang="en-US" smtClean="0"/>
+              <a:rPr lang="en-US"/>
               <a:t>Click to edit Master text styles</a:t>
             </a:r>
           </a:p>
           <a:p>
             <a:pPr lvl="1"/>
             <a:r>
-              <a:rPr lang="en-US" smtClean="0"/>
+              <a:rPr lang="en-US"/>
               <a:t>Second level</a:t>
             </a:r>
           </a:p>
           <a:p>
             <a:pPr lvl="2"/>
             <a:r>
-              <a:rPr lang="en-US" smtClean="0"/>
+              <a:rPr lang="en-US"/>
               <a:t>Third level</a:t>
             </a:r>
           </a:p>
           <a:p>
             <a:pPr lvl="3"/>
             <a:r>
-              <a:rPr lang="en-US" smtClean="0"/>
+              <a:rPr lang="en-US"/>
               <a:t>Fourth level</a:t>
             </a:r>
           </a:p>
           <a:p>
             <a:pPr lvl="4"/>
             <a:r>
-              <a:rPr lang="en-US" smtClean="0"/>
+              <a:rPr lang="en-US"/>
               <a:t>Fifth level</a:t>
             </a:r>
-            <a:endParaRPr lang="en-US"/>
           </a:p>
         </p:txBody>
       </p:sp>
@@ -3073,7 +3151,7 @@
           <a:p>
             <a:fld id="{78C97017-6FC3-485B-9764-EAC9E56C1D49}" type="datetimeFigureOut">
               <a:rPr lang="en-US" smtClean="0"/>
-              <a:t>10/16/2016</a:t>
+              <a:t>11/11/2018</a:t>
             </a:fld>
             <a:endParaRPr lang="en-US"/>
           </a:p>
@@ -3456,8 +3534,8 @@
         </p:nvSpPr>
         <p:spPr>
           <a:xfrm>
-            <a:off x="1119865" y="2086382"/>
-            <a:ext cx="7871735" cy="1723618"/>
+            <a:off x="164520" y="1817108"/>
+            <a:ext cx="8744626" cy="2737732"/>
           </a:xfrm>
           <a:prstGeom prst="roundRect">
             <a:avLst>
@@ -3494,7 +3572,7 @@
           <a:lstStyle/>
           <a:p>
             <a:r>
-              <a:rPr lang="en-US" sz="1200" b="1" dirty="0" smtClean="0">
+              <a:rPr lang="en-US" sz="1200" b="1" dirty="0">
                 <a:solidFill>
                   <a:schemeClr val="accent6">
                     <a:lumMod val="75000"/>
@@ -3521,7 +3599,7 @@
         </p:nvSpPr>
         <p:spPr>
           <a:xfrm>
-            <a:off x="2877180" y="3158440"/>
+            <a:off x="2043242" y="3017605"/>
             <a:ext cx="1323049" cy="346760"/>
           </a:xfrm>
           <a:prstGeom prst="rect">
@@ -3561,7 +3639,7 @@
           <a:p>
             <a:pPr algn="ctr"/>
             <a:r>
-              <a:rPr lang="en-US" sz="1050" dirty="0" smtClean="0">
+              <a:rPr lang="en-US" sz="1050" dirty="0">
                 <a:solidFill>
                   <a:schemeClr val="bg1"/>
                 </a:solidFill>
@@ -3569,14 +3647,14 @@
               <a:t>&lt;&lt;interface&gt;&gt;</a:t>
             </a:r>
             <a:br>
-              <a:rPr lang="en-US" sz="1050" dirty="0" smtClean="0">
+              <a:rPr lang="en-US" sz="1050" dirty="0">
                 <a:solidFill>
                   <a:schemeClr val="bg1"/>
                 </a:solidFill>
               </a:rPr>
             </a:br>
             <a:r>
-              <a:rPr lang="en-US" sz="1050" dirty="0" err="1" smtClean="0">
+              <a:rPr lang="en-US" sz="1050" dirty="0" err="1">
                 <a:solidFill>
                   <a:schemeClr val="bg1"/>
                 </a:solidFill>
@@ -3599,7 +3677,7 @@
         </p:nvSpPr>
         <p:spPr>
           <a:xfrm rot="16200000">
-            <a:off x="1683963" y="2868687"/>
+            <a:off x="850025" y="2727852"/>
             <a:ext cx="1093635" cy="346760"/>
           </a:xfrm>
           <a:prstGeom prst="rect">
@@ -3639,7 +3717,7 @@
           <a:p>
             <a:pPr algn="ctr"/>
             <a:r>
-              <a:rPr lang="en-US" sz="1050" dirty="0" err="1" smtClean="0">
+              <a:rPr lang="en-US" sz="1050" dirty="0" err="1">
                 <a:solidFill>
                   <a:schemeClr val="bg1"/>
                 </a:solidFill>
@@ -3662,7 +3740,7 @@
         </p:nvSpPr>
         <p:spPr>
           <a:xfrm rot="16200000">
-            <a:off x="956202" y="2861202"/>
+            <a:off x="122264" y="2720367"/>
             <a:ext cx="1093635" cy="346760"/>
           </a:xfrm>
           <a:prstGeom prst="rect">
@@ -3713,7 +3791,7 @@
           <a:p>
             <a:pPr algn="ctr"/>
             <a:r>
-              <a:rPr lang="en-US" sz="1050" dirty="0" smtClean="0">
+              <a:rPr lang="en-US" sz="1050" dirty="0">
                 <a:solidFill>
                   <a:schemeClr val="bg1"/>
                 </a:solidFill>
@@ -3736,7 +3814,7 @@
         </p:nvSpPr>
         <p:spPr>
           <a:xfrm rot="16200000">
-            <a:off x="1626910" y="2952291"/>
+            <a:off x="792972" y="2811456"/>
             <a:ext cx="270504" cy="175523"/>
           </a:xfrm>
           <a:prstGeom prst="triangle">
@@ -3794,7 +3872,7 @@
         </p:nvCxnSpPr>
         <p:spPr>
           <a:xfrm>
-            <a:off x="2656370" y="3326536"/>
+            <a:off x="1822432" y="3185701"/>
             <a:ext cx="220810" cy="5284"/>
           </a:xfrm>
           <a:prstGeom prst="straightConnector1">
@@ -3834,7 +3912,7 @@
         </p:nvCxnSpPr>
         <p:spPr>
           <a:xfrm>
-            <a:off x="910091" y="3040053"/>
+            <a:off x="76153" y="2899218"/>
             <a:ext cx="419548" cy="2860"/>
           </a:xfrm>
           <a:prstGeom prst="bentConnector3">
@@ -3879,7 +3957,7 @@
         </p:nvCxnSpPr>
         <p:spPr>
           <a:xfrm flipV="1">
-            <a:off x="1849924" y="3040052"/>
+            <a:off x="1015986" y="2899217"/>
             <a:ext cx="216105" cy="1"/>
           </a:xfrm>
           <a:prstGeom prst="line">
@@ -3920,7 +3998,7 @@
         </p:nvSpPr>
         <p:spPr>
           <a:xfrm>
-            <a:off x="2420322" y="3239846"/>
+            <a:off x="1586384" y="3099011"/>
             <a:ext cx="236048" cy="173380"/>
           </a:xfrm>
           <a:prstGeom prst="flowChartDecision">
@@ -3974,7 +4052,7 @@
         </p:nvCxnSpPr>
         <p:spPr>
           <a:xfrm flipV="1">
-            <a:off x="4398041" y="3331820"/>
+            <a:off x="3564103" y="3190985"/>
             <a:ext cx="223324" cy="1"/>
           </a:xfrm>
           <a:prstGeom prst="bentConnector3">
@@ -4017,7 +4095,7 @@
         </p:nvSpPr>
         <p:spPr>
           <a:xfrm rot="5400000" flipV="1">
-            <a:off x="4175027" y="3244059"/>
+            <a:off x="3341089" y="3103224"/>
             <a:ext cx="270504" cy="175523"/>
           </a:xfrm>
           <a:prstGeom prst="triangle">
@@ -4075,7 +4153,7 @@
         </p:nvCxnSpPr>
         <p:spPr>
           <a:xfrm>
-            <a:off x="5791200" y="3331820"/>
+            <a:off x="4957262" y="3190985"/>
             <a:ext cx="228600" cy="1970"/>
           </a:xfrm>
           <a:prstGeom prst="bentConnector3">
@@ -4118,7 +4196,7 @@
         </p:nvSpPr>
         <p:spPr>
           <a:xfrm>
-            <a:off x="4621365" y="3158440"/>
+            <a:off x="3787427" y="3017605"/>
             <a:ext cx="1169835" cy="346760"/>
           </a:xfrm>
           <a:prstGeom prst="rect">
@@ -4147,7 +4225,7 @@
           <a:p>
             <a:pPr algn="ctr"/>
             <a:r>
-              <a:rPr lang="en-US" sz="1050" b="1" dirty="0" err="1" smtClean="0">
+              <a:rPr lang="en-US" sz="1050" b="1" dirty="0" err="1">
                 <a:solidFill>
                   <a:schemeClr val="accent6">
                     <a:lumMod val="75000"/>
@@ -4156,18 +4234,8 @@
               </a:rPr>
               <a:t>XmlAddressBook</a:t>
             </a:r>
-            <a:r>
-              <a:rPr lang="en-US" sz="1050" b="1" dirty="0" smtClean="0">
-                <a:solidFill>
-                  <a:schemeClr val="accent6">
-                    <a:lumMod val="75000"/>
-                  </a:schemeClr>
-                </a:solidFill>
-              </a:rPr>
-              <a:t/>
-            </a:r>
             <a:br>
-              <a:rPr lang="en-US" sz="1050" b="1" dirty="0" smtClean="0">
+              <a:rPr lang="en-US" sz="1050" b="1" dirty="0">
                 <a:solidFill>
                   <a:schemeClr val="accent6">
                     <a:lumMod val="75000"/>
@@ -4176,7 +4244,7 @@
               </a:rPr>
             </a:br>
             <a:r>
-              <a:rPr lang="en-US" sz="1050" b="1" dirty="0" smtClean="0">
+              <a:rPr lang="en-US" sz="1050" b="1" dirty="0">
                 <a:solidFill>
                   <a:schemeClr val="accent6">
                     <a:lumMod val="75000"/>
@@ -4203,7 +4271,7 @@
         </p:nvSpPr>
         <p:spPr>
           <a:xfrm>
-            <a:off x="2873943" y="2558040"/>
+            <a:off x="2040005" y="2417205"/>
             <a:ext cx="1323049" cy="346760"/>
           </a:xfrm>
           <a:prstGeom prst="rect">
@@ -4243,7 +4311,7 @@
           <a:p>
             <a:pPr algn="ctr"/>
             <a:r>
-              <a:rPr lang="en-US" sz="1050" dirty="0" smtClean="0">
+              <a:rPr lang="en-US" sz="1050" dirty="0">
                 <a:solidFill>
                   <a:schemeClr val="bg1"/>
                 </a:solidFill>
@@ -4251,14 +4319,14 @@
               <a:t>&lt;&lt;interface&gt;&gt;</a:t>
             </a:r>
             <a:br>
-              <a:rPr lang="en-US" sz="1050" dirty="0" smtClean="0">
+              <a:rPr lang="en-US" sz="1050" dirty="0">
                 <a:solidFill>
                   <a:schemeClr val="bg1"/>
                 </a:solidFill>
               </a:rPr>
             </a:br>
             <a:r>
-              <a:rPr lang="en-US" sz="1050" dirty="0" err="1" smtClean="0">
+              <a:rPr lang="en-US" sz="1050" dirty="0" err="1">
                 <a:solidFill>
                   <a:schemeClr val="bg1"/>
                 </a:solidFill>
@@ -4284,7 +4352,7 @@
         </p:nvCxnSpPr>
         <p:spPr>
           <a:xfrm>
-            <a:off x="2653133" y="2726136"/>
+            <a:off x="1819195" y="2585301"/>
             <a:ext cx="220810" cy="5284"/>
           </a:xfrm>
           <a:prstGeom prst="straightConnector1">
@@ -4324,7 +4392,7 @@
         </p:nvSpPr>
         <p:spPr>
           <a:xfrm>
-            <a:off x="2417085" y="2639446"/>
+            <a:off x="1583147" y="2498611"/>
             <a:ext cx="236048" cy="173380"/>
           </a:xfrm>
           <a:prstGeom prst="flowChartDecision">
@@ -4378,7 +4446,7 @@
         </p:nvCxnSpPr>
         <p:spPr>
           <a:xfrm flipV="1">
-            <a:off x="4394804" y="2731420"/>
+            <a:off x="3560866" y="2590585"/>
             <a:ext cx="223324" cy="1"/>
           </a:xfrm>
           <a:prstGeom prst="bentConnector3">
@@ -4421,7 +4489,7 @@
         </p:nvSpPr>
         <p:spPr>
           <a:xfrm rot="5400000" flipV="1">
-            <a:off x="4171790" y="2643659"/>
+            <a:off x="3337852" y="2502824"/>
             <a:ext cx="270504" cy="175523"/>
           </a:xfrm>
           <a:prstGeom prst="triangle">
@@ -4476,7 +4544,7 @@
         </p:nvSpPr>
         <p:spPr>
           <a:xfrm>
-            <a:off x="4618128" y="2558040"/>
+            <a:off x="3784190" y="2417205"/>
             <a:ext cx="1093635" cy="346760"/>
           </a:xfrm>
           <a:prstGeom prst="rect">
@@ -4516,30 +4584,22 @@
           <a:p>
             <a:pPr algn="ctr"/>
             <a:r>
-              <a:rPr lang="en-US" sz="1050" dirty="0" err="1" smtClean="0">
+              <a:rPr lang="en-US" sz="1050" dirty="0" err="1">
                 <a:solidFill>
                   <a:schemeClr val="bg1"/>
                 </a:solidFill>
               </a:rPr>
               <a:t>JsonUserPrefs</a:t>
             </a:r>
-            <a:r>
-              <a:rPr lang="en-US" sz="1050" dirty="0" smtClean="0">
-                <a:solidFill>
-                  <a:schemeClr val="bg1"/>
-                </a:solidFill>
-              </a:rPr>
-              <a:t/>
-            </a:r>
             <a:br>
-              <a:rPr lang="en-US" sz="1050" dirty="0" smtClean="0">
+              <a:rPr lang="en-US" sz="1050" dirty="0">
                 <a:solidFill>
                   <a:schemeClr val="bg1"/>
                 </a:solidFill>
               </a:rPr>
             </a:br>
             <a:r>
-              <a:rPr lang="en-US" sz="1050" dirty="0" smtClean="0">
+              <a:rPr lang="en-US" sz="1050" dirty="0">
                 <a:solidFill>
                   <a:schemeClr val="bg1"/>
                 </a:solidFill>
@@ -4562,7 +4622,7 @@
         </p:nvSpPr>
         <p:spPr>
           <a:xfrm>
-            <a:off x="6019800" y="3160410"/>
+            <a:off x="5185862" y="3019575"/>
             <a:ext cx="1200707" cy="346760"/>
           </a:xfrm>
           <a:prstGeom prst="rect">
@@ -4591,7 +4651,7 @@
           <a:p>
             <a:pPr algn="ctr"/>
             <a:r>
-              <a:rPr lang="en-US" sz="1050" b="1" dirty="0" err="1" smtClean="0">
+              <a:rPr lang="en-US" sz="1050" b="1" dirty="0" err="1">
                 <a:solidFill>
                   <a:schemeClr val="accent6">
                     <a:lumMod val="75000"/>
@@ -4600,18 +4660,8 @@
               </a:rPr>
               <a:t>XmlSerializable</a:t>
             </a:r>
-            <a:r>
-              <a:rPr lang="en-US" sz="1050" b="1" dirty="0" smtClean="0">
-                <a:solidFill>
-                  <a:schemeClr val="accent6">
-                    <a:lumMod val="75000"/>
-                  </a:schemeClr>
-                </a:solidFill>
-              </a:rPr>
-              <a:t/>
-            </a:r>
             <a:br>
-              <a:rPr lang="en-US" sz="1050" b="1" dirty="0" smtClean="0">
+              <a:rPr lang="en-US" sz="1050" b="1" dirty="0">
                 <a:solidFill>
                   <a:schemeClr val="accent6">
                     <a:lumMod val="75000"/>
@@ -4620,7 +4670,7 @@
               </a:rPr>
             </a:br>
             <a:r>
-              <a:rPr lang="en-US" sz="1050" b="1" dirty="0" err="1" smtClean="0">
+              <a:rPr lang="en-US" sz="1050" b="1" dirty="0" err="1">
                 <a:solidFill>
                   <a:schemeClr val="accent6">
                     <a:lumMod val="75000"/>
@@ -4643,19 +4693,20 @@
         <p:nvCxnSpPr>
           <p:cNvPr id="70" name="Elbow Connector 122"/>
           <p:cNvCxnSpPr>
+            <a:cxnSpLocks/>
             <a:stCxn id="74" idx="0"/>
-            <a:endCxn id="73" idx="2"/>
+            <a:endCxn id="73" idx="0"/>
           </p:cNvCxnSpPr>
           <p:nvPr/>
         </p:nvCxnSpPr>
         <p:spPr>
-          <a:xfrm rot="5400000" flipH="1" flipV="1">
-            <a:off x="8077993" y="2992020"/>
-            <a:ext cx="335208" cy="12700"/>
+          <a:xfrm rot="16200000" flipH="1">
+            <a:off x="6670816" y="1485650"/>
+            <a:ext cx="659215" cy="2423437"/>
           </a:xfrm>
           <a:prstGeom prst="bentConnector3">
             <a:avLst>
-              <a:gd name="adj1" fmla="val 50000"/>
+              <a:gd name="adj1" fmla="val -34678"/>
             </a:avLst>
           </a:prstGeom>
           <a:ln w="19050">
@@ -4688,7 +4739,7 @@
         </p:nvSpPr>
         <p:spPr>
           <a:xfrm>
-            <a:off x="7615738" y="2477656"/>
+            <a:off x="7582284" y="3026976"/>
             <a:ext cx="1259718" cy="346760"/>
           </a:xfrm>
           <a:prstGeom prst="rect">
@@ -4717,7 +4768,7 @@
           <a:p>
             <a:pPr algn="ctr"/>
             <a:r>
-              <a:rPr lang="en-US" sz="1050" b="1" dirty="0" err="1" smtClean="0">
+              <a:rPr lang="en-US" sz="1050" b="1" dirty="0" err="1">
                 <a:solidFill>
                   <a:schemeClr val="accent6">
                     <a:lumMod val="75000"/>
@@ -4744,7 +4795,7 @@
         </p:nvSpPr>
         <p:spPr>
           <a:xfrm>
-            <a:off x="7615738" y="3159624"/>
+            <a:off x="5158847" y="2367761"/>
             <a:ext cx="1259718" cy="346760"/>
           </a:xfrm>
           <a:prstGeom prst="rect">
@@ -4773,7 +4824,7 @@
           <a:p>
             <a:pPr algn="ctr"/>
             <a:r>
-              <a:rPr lang="en-US" sz="1050" b="1" dirty="0" err="1" smtClean="0">
+              <a:rPr lang="en-US" sz="1050" b="1" dirty="0" err="1">
                 <a:solidFill>
                   <a:schemeClr val="accent6">
                     <a:lumMod val="75000"/>
@@ -4796,15 +4847,394 @@
         <p:nvCxnSpPr>
           <p:cNvPr id="77" name="Elbow Connector 122"/>
           <p:cNvCxnSpPr>
-            <a:stCxn id="66" idx="3"/>
-            <a:endCxn id="74" idx="1"/>
+            <a:cxnSpLocks/>
+            <a:stCxn id="66" idx="0"/>
+            <a:endCxn id="74" idx="2"/>
           </p:cNvCxnSpPr>
           <p:nvPr/>
         </p:nvCxnSpPr>
         <p:spPr>
-          <a:xfrm flipV="1">
-            <a:off x="7220507" y="3333004"/>
-            <a:ext cx="395231" cy="786"/>
+          <a:xfrm rot="5400000" flipH="1" flipV="1">
+            <a:off x="5634934" y="2865803"/>
+            <a:ext cx="305054" cy="2490"/>
+          </a:xfrm>
+          <a:prstGeom prst="bentConnector3">
+            <a:avLst>
+              <a:gd name="adj1" fmla="val 50000"/>
+            </a:avLst>
+          </a:prstGeom>
+          <a:ln w="19050">
+            <a:prstDash val="sysDot"/>
+            <a:headEnd type="none" w="med" len="med"/>
+            <a:tailEnd type="arrow" w="med" len="med"/>
+          </a:ln>
+          <a:effectLst/>
+        </p:spPr>
+        <p:style>
+          <a:lnRef idx="1">
+            <a:schemeClr val="accent6"/>
+          </a:lnRef>
+          <a:fillRef idx="2">
+            <a:schemeClr val="accent6"/>
+          </a:fillRef>
+          <a:effectRef idx="1">
+            <a:schemeClr val="accent6"/>
+          </a:effectRef>
+          <a:fontRef idx="minor">
+            <a:schemeClr val="dk1"/>
+          </a:fontRef>
+        </p:style>
+      </p:cxnSp>
+      <p:sp>
+        <p:nvSpPr>
+          <p:cNvPr id="35" name="Rectangle 8">
+            <a:extLst>
+              <a:ext uri="{FF2B5EF4-FFF2-40B4-BE49-F238E27FC236}">
+                <a16:creationId xmlns:a16="http://schemas.microsoft.com/office/drawing/2014/main" id="{3E1CA83C-D5C2-4990-AB50-C41E0F77EEB6}"/>
+              </a:ext>
+            </a:extLst>
+          </p:cNvPr>
+          <p:cNvSpPr/>
+          <p:nvPr/>
+        </p:nvSpPr>
+        <p:spPr>
+          <a:xfrm>
+            <a:off x="5156356" y="3667792"/>
+            <a:ext cx="1259718" cy="346760"/>
+          </a:xfrm>
+          <a:prstGeom prst="rect">
+            <a:avLst/>
+          </a:prstGeom>
+          <a:ln w="19050"/>
+          <a:effectLst/>
+        </p:spPr>
+        <p:style>
+          <a:lnRef idx="1">
+            <a:schemeClr val="accent6"/>
+          </a:lnRef>
+          <a:fillRef idx="2">
+            <a:schemeClr val="accent6"/>
+          </a:fillRef>
+          <a:effectRef idx="1">
+            <a:schemeClr val="accent6"/>
+          </a:effectRef>
+          <a:fontRef idx="minor">
+            <a:schemeClr val="dk1"/>
+          </a:fontRef>
+        </p:style>
+        <p:txBody>
+          <a:bodyPr rtlCol="0" anchor="ctr"/>
+          <a:lstStyle/>
+          <a:p>
+            <a:pPr algn="ctr"/>
+            <a:r>
+              <a:rPr lang="en-US" sz="1050" b="1" dirty="0" err="1">
+                <a:solidFill>
+                  <a:schemeClr val="accent6">
+                    <a:lumMod val="75000"/>
+                  </a:schemeClr>
+                </a:solidFill>
+              </a:rPr>
+              <a:t>XmlAdaptedTask</a:t>
+            </a:r>
+            <a:endParaRPr lang="en-SG" sz="1050" b="1" dirty="0">
+              <a:solidFill>
+                <a:schemeClr val="accent6">
+                  <a:lumMod val="75000"/>
+                </a:schemeClr>
+              </a:solidFill>
+            </a:endParaRPr>
+          </a:p>
+        </p:txBody>
+      </p:sp>
+      <p:cxnSp>
+        <p:nvCxnSpPr>
+          <p:cNvPr id="36" name="Elbow Connector 122">
+            <a:extLst>
+              <a:ext uri="{FF2B5EF4-FFF2-40B4-BE49-F238E27FC236}">
+                <a16:creationId xmlns:a16="http://schemas.microsoft.com/office/drawing/2014/main" id="{7B33699A-AC32-4A2F-9395-D5DA72A7ED8B}"/>
+              </a:ext>
+            </a:extLst>
+          </p:cNvPr>
+          <p:cNvCxnSpPr>
+            <a:cxnSpLocks/>
+            <a:stCxn id="66" idx="2"/>
+            <a:endCxn id="35" idx="0"/>
+          </p:cNvCxnSpPr>
+          <p:nvPr/>
+        </p:nvCxnSpPr>
+        <p:spPr>
+          <a:xfrm rot="5400000">
+            <a:off x="5635488" y="3517063"/>
+            <a:ext cx="301457" cy="1"/>
+          </a:xfrm>
+          <a:prstGeom prst="bentConnector3">
+            <a:avLst>
+              <a:gd name="adj1" fmla="val 50000"/>
+            </a:avLst>
+          </a:prstGeom>
+          <a:ln w="19050">
+            <a:prstDash val="sysDot"/>
+            <a:headEnd type="none" w="med" len="med"/>
+            <a:tailEnd type="arrow" w="med" len="med"/>
+          </a:ln>
+          <a:effectLst/>
+        </p:spPr>
+        <p:style>
+          <a:lnRef idx="1">
+            <a:schemeClr val="accent6"/>
+          </a:lnRef>
+          <a:fillRef idx="2">
+            <a:schemeClr val="accent6"/>
+          </a:fillRef>
+          <a:effectRef idx="1">
+            <a:schemeClr val="accent6"/>
+          </a:effectRef>
+          <a:fontRef idx="minor">
+            <a:schemeClr val="dk1"/>
+          </a:fontRef>
+        </p:style>
+      </p:cxnSp>
+      <p:cxnSp>
+        <p:nvCxnSpPr>
+          <p:cNvPr id="41" name="Elbow Connector 122">
+            <a:extLst>
+              <a:ext uri="{FF2B5EF4-FFF2-40B4-BE49-F238E27FC236}">
+                <a16:creationId xmlns:a16="http://schemas.microsoft.com/office/drawing/2014/main" id="{63455163-89A8-4982-B2C9-BF150DFCFBC4}"/>
+              </a:ext>
+            </a:extLst>
+          </p:cNvPr>
+          <p:cNvCxnSpPr>
+            <a:cxnSpLocks/>
+            <a:stCxn id="35" idx="2"/>
+            <a:endCxn id="73" idx="2"/>
+          </p:cNvCxnSpPr>
+          <p:nvPr/>
+        </p:nvCxnSpPr>
+        <p:spPr>
+          <a:xfrm rot="5400000" flipH="1" flipV="1">
+            <a:off x="6678771" y="2481180"/>
+            <a:ext cx="640816" cy="2425928"/>
+          </a:xfrm>
+          <a:prstGeom prst="bentConnector3">
+            <a:avLst>
+              <a:gd name="adj1" fmla="val -35673"/>
+            </a:avLst>
+          </a:prstGeom>
+          <a:ln w="19050">
+            <a:prstDash val="sysDot"/>
+            <a:headEnd type="none" w="med" len="med"/>
+            <a:tailEnd type="arrow" w="med" len="med"/>
+          </a:ln>
+          <a:effectLst/>
+        </p:spPr>
+        <p:style>
+          <a:lnRef idx="1">
+            <a:schemeClr val="accent6"/>
+          </a:lnRef>
+          <a:fillRef idx="2">
+            <a:schemeClr val="accent6"/>
+          </a:fillRef>
+          <a:effectRef idx="1">
+            <a:schemeClr val="accent6"/>
+          </a:effectRef>
+          <a:fontRef idx="minor">
+            <a:schemeClr val="dk1"/>
+          </a:fontRef>
+        </p:style>
+      </p:cxnSp>
+      <p:sp>
+        <p:nvSpPr>
+          <p:cNvPr id="47" name="Rectangle 8">
+            <a:extLst>
+              <a:ext uri="{FF2B5EF4-FFF2-40B4-BE49-F238E27FC236}">
+                <a16:creationId xmlns:a16="http://schemas.microsoft.com/office/drawing/2014/main" id="{3294508B-21A0-4FF6-9CCD-13476D4439B1}"/>
+              </a:ext>
+            </a:extLst>
+          </p:cNvPr>
+          <p:cNvSpPr/>
+          <p:nvPr/>
+        </p:nvSpPr>
+        <p:spPr>
+          <a:xfrm>
+            <a:off x="6856771" y="2367761"/>
+            <a:ext cx="1259718" cy="346760"/>
+          </a:xfrm>
+          <a:prstGeom prst="rect">
+            <a:avLst/>
+          </a:prstGeom>
+          <a:ln w="19050"/>
+          <a:effectLst/>
+        </p:spPr>
+        <p:style>
+          <a:lnRef idx="1">
+            <a:schemeClr val="accent6"/>
+          </a:lnRef>
+          <a:fillRef idx="2">
+            <a:schemeClr val="accent6"/>
+          </a:fillRef>
+          <a:effectRef idx="1">
+            <a:schemeClr val="accent6"/>
+          </a:effectRef>
+          <a:fontRef idx="minor">
+            <a:schemeClr val="dk1"/>
+          </a:fontRef>
+        </p:style>
+        <p:txBody>
+          <a:bodyPr rtlCol="0" anchor="ctr"/>
+          <a:lstStyle/>
+          <a:p>
+            <a:pPr algn="ctr"/>
+            <a:r>
+              <a:rPr lang="en-US" sz="1050" b="1" dirty="0" err="1">
+                <a:solidFill>
+                  <a:schemeClr val="accent6">
+                    <a:lumMod val="75000"/>
+                  </a:schemeClr>
+                </a:solidFill>
+              </a:rPr>
+              <a:t>XmlAdaptedTaskId</a:t>
+            </a:r>
+            <a:endParaRPr lang="en-SG" sz="1050" b="1" dirty="0">
+              <a:solidFill>
+                <a:schemeClr val="accent6">
+                  <a:lumMod val="75000"/>
+                </a:schemeClr>
+              </a:solidFill>
+            </a:endParaRPr>
+          </a:p>
+        </p:txBody>
+      </p:sp>
+      <p:sp>
+        <p:nvSpPr>
+          <p:cNvPr id="48" name="Rectangle 8">
+            <a:extLst>
+              <a:ext uri="{FF2B5EF4-FFF2-40B4-BE49-F238E27FC236}">
+                <a16:creationId xmlns:a16="http://schemas.microsoft.com/office/drawing/2014/main" id="{738A426D-C717-467A-9C68-756759973239}"/>
+              </a:ext>
+            </a:extLst>
+          </p:cNvPr>
+          <p:cNvSpPr/>
+          <p:nvPr/>
+        </p:nvSpPr>
+        <p:spPr>
+          <a:xfrm>
+            <a:off x="6856771" y="3667792"/>
+            <a:ext cx="1259718" cy="346760"/>
+          </a:xfrm>
+          <a:prstGeom prst="rect">
+            <a:avLst/>
+          </a:prstGeom>
+          <a:ln w="19050"/>
+          <a:effectLst/>
+        </p:spPr>
+        <p:style>
+          <a:lnRef idx="1">
+            <a:schemeClr val="accent6"/>
+          </a:lnRef>
+          <a:fillRef idx="2">
+            <a:schemeClr val="accent6"/>
+          </a:fillRef>
+          <a:effectRef idx="1">
+            <a:schemeClr val="accent6"/>
+          </a:effectRef>
+          <a:fontRef idx="minor">
+            <a:schemeClr val="dk1"/>
+          </a:fontRef>
+        </p:style>
+        <p:txBody>
+          <a:bodyPr rtlCol="0" anchor="ctr"/>
+          <a:lstStyle/>
+          <a:p>
+            <a:pPr algn="ctr"/>
+            <a:r>
+              <a:rPr lang="en-US" sz="900" b="1" dirty="0" err="1">
+                <a:solidFill>
+                  <a:schemeClr val="accent6">
+                    <a:lumMod val="75000"/>
+                  </a:schemeClr>
+                </a:solidFill>
+              </a:rPr>
+              <a:t>XmlAdaptedPersonId</a:t>
+            </a:r>
+            <a:endParaRPr lang="en-SG" sz="1200" b="1" dirty="0">
+              <a:solidFill>
+                <a:schemeClr val="accent6">
+                  <a:lumMod val="75000"/>
+                </a:schemeClr>
+              </a:solidFill>
+            </a:endParaRPr>
+          </a:p>
+        </p:txBody>
+      </p:sp>
+      <p:cxnSp>
+        <p:nvCxnSpPr>
+          <p:cNvPr id="49" name="Elbow Connector 122">
+            <a:extLst>
+              <a:ext uri="{FF2B5EF4-FFF2-40B4-BE49-F238E27FC236}">
+                <a16:creationId xmlns:a16="http://schemas.microsoft.com/office/drawing/2014/main" id="{12E52D8E-FA71-4FD8-B24A-54D9AD724B43}"/>
+              </a:ext>
+            </a:extLst>
+          </p:cNvPr>
+          <p:cNvCxnSpPr>
+            <a:cxnSpLocks/>
+            <a:stCxn id="74" idx="3"/>
+            <a:endCxn id="47" idx="1"/>
+          </p:cNvCxnSpPr>
+          <p:nvPr/>
+        </p:nvCxnSpPr>
+        <p:spPr>
+          <a:xfrm>
+            <a:off x="6418565" y="2541141"/>
+            <a:ext cx="438206" cy="12700"/>
+          </a:xfrm>
+          <a:prstGeom prst="bentConnector3">
+            <a:avLst>
+              <a:gd name="adj1" fmla="val 50000"/>
+            </a:avLst>
+          </a:prstGeom>
+          <a:ln w="19050">
+            <a:prstDash val="sysDot"/>
+            <a:headEnd type="none" w="med" len="med"/>
+            <a:tailEnd type="arrow" w="med" len="med"/>
+          </a:ln>
+          <a:effectLst/>
+        </p:spPr>
+        <p:style>
+          <a:lnRef idx="1">
+            <a:schemeClr val="accent6"/>
+          </a:lnRef>
+          <a:fillRef idx="2">
+            <a:schemeClr val="accent6"/>
+          </a:fillRef>
+          <a:effectRef idx="1">
+            <a:schemeClr val="accent6"/>
+          </a:effectRef>
+          <a:fontRef idx="minor">
+            <a:schemeClr val="dk1"/>
+          </a:fontRef>
+        </p:style>
+      </p:cxnSp>
+      <p:cxnSp>
+        <p:nvCxnSpPr>
+          <p:cNvPr id="57" name="Elbow Connector 122">
+            <a:extLst>
+              <a:ext uri="{FF2B5EF4-FFF2-40B4-BE49-F238E27FC236}">
+                <a16:creationId xmlns:a16="http://schemas.microsoft.com/office/drawing/2014/main" id="{9FFBB4BC-08A9-4B42-9C0E-089CE1572EF3}"/>
+              </a:ext>
+            </a:extLst>
+          </p:cNvPr>
+          <p:cNvCxnSpPr>
+            <a:cxnSpLocks/>
+            <a:stCxn id="35" idx="3"/>
+            <a:endCxn id="48" idx="1"/>
+          </p:cNvCxnSpPr>
+          <p:nvPr/>
+        </p:nvCxnSpPr>
+        <p:spPr>
+          <a:xfrm>
+            <a:off x="6416074" y="3841172"/>
+            <a:ext cx="440697" cy="12700"/>
           </a:xfrm>
           <a:prstGeom prst="bentConnector3">
             <a:avLst>
@@ -4843,13 +5273,6 @@
   <p:clrMapOvr>
     <a:masterClrMapping/>
   </p:clrMapOvr>
-  <p:timing>
-    <p:tnLst>
-      <p:par>
-        <p:cTn id="1" dur="indefinite" restart="never" nodeType="tmRoot"/>
-      </p:par>
-    </p:tnLst>
-  </p:timing>
 </p:sld>
 </file>
 

</xml_diff>